<commit_message>
fix error in image
</commit_message>
<xml_diff>
--- a/docs/diagrams/Diagrams.pptx
+++ b/docs/diagrams/Diagrams.pptx
@@ -3416,7 +3416,7 @@
         </p:nvSpPr>
         <p:spPr>
           <a:xfrm>
-            <a:off x="457200" y="638174"/>
+            <a:off x="419099" y="631189"/>
             <a:ext cx="11658600" cy="5200651"/>
           </a:xfrm>
           <a:prstGeom prst="rect">
@@ -3456,10 +3456,10 @@
       </p:sp>
       <p:grpSp>
         <p:nvGrpSpPr>
-          <p:cNvPr id="1054" name="Group 1053">
-            <a:extLst>
-              <a:ext uri="{FF2B5EF4-FFF2-40B4-BE49-F238E27FC236}">
-                <a16:creationId xmlns:a16="http://schemas.microsoft.com/office/drawing/2014/main" id="{6EE572B6-2C2B-434A-B944-A07C4671BD7E}"/>
+          <p:cNvPr id="5" name="Group 4">
+            <a:extLst>
+              <a:ext uri="{FF2B5EF4-FFF2-40B4-BE49-F238E27FC236}">
+                <a16:creationId xmlns:a16="http://schemas.microsoft.com/office/drawing/2014/main" id="{365ECFA9-9343-49D7-8A5C-9AA60B27883E}"/>
               </a:ext>
             </a:extLst>
           </p:cNvPr>
@@ -3476,10 +3476,10 @@
         </p:grpSpPr>
         <p:grpSp>
           <p:nvGrpSpPr>
-            <p:cNvPr id="1053" name="Group 1052">
+            <p:cNvPr id="1054" name="Group 1053">
               <a:extLst>
                 <a:ext uri="{FF2B5EF4-FFF2-40B4-BE49-F238E27FC236}">
-                  <a16:creationId xmlns:a16="http://schemas.microsoft.com/office/drawing/2014/main" id="{6C52C2BA-6090-403E-9F8F-5486319FEE12}"/>
+                  <a16:creationId xmlns:a16="http://schemas.microsoft.com/office/drawing/2014/main" id="{6EE572B6-2C2B-434A-B944-A07C4671BD7E}"/>
                 </a:ext>
               </a:extLst>
             </p:cNvPr>
@@ -3488,76 +3488,18 @@
           </p:nvGrpSpPr>
           <p:grpSpPr>
             <a:xfrm>
-              <a:off x="635635" y="802640"/>
-              <a:ext cx="10920730" cy="4857750"/>
-              <a:chOff x="635635" y="802640"/>
-              <a:chExt cx="10920730" cy="4857750"/>
+              <a:off x="540066" y="802640"/>
+              <a:ext cx="11651934" cy="4857750"/>
+              <a:chOff x="540066" y="802640"/>
+              <a:chExt cx="11651934" cy="4857750"/>
             </a:xfrm>
           </p:grpSpPr>
-          <p:sp>
-            <p:nvSpPr>
-              <p:cNvPr id="4" name="Rectangle: Rounded Corners 3">
+          <p:grpSp>
+            <p:nvGrpSpPr>
+              <p:cNvPr id="1053" name="Group 1052">
                 <a:extLst>
                   <a:ext uri="{FF2B5EF4-FFF2-40B4-BE49-F238E27FC236}">
-                    <a16:creationId xmlns:a16="http://schemas.microsoft.com/office/drawing/2014/main" id="{94BB7528-F274-4A12-AD63-6689E3636CED}"/>
-                  </a:ext>
-                </a:extLst>
-              </p:cNvPr>
-              <p:cNvSpPr/>
-              <p:nvPr/>
-            </p:nvSpPr>
-            <p:spPr>
-              <a:xfrm>
-                <a:off x="2341402" y="802640"/>
-                <a:ext cx="7978458" cy="4857750"/>
-              </a:xfrm>
-              <a:prstGeom prst="roundRect">
-                <a:avLst/>
-              </a:prstGeom>
-              <a:solidFill>
-                <a:schemeClr val="bg1">
-                  <a:lumMod val="95000"/>
-                </a:schemeClr>
-              </a:solidFill>
-              <a:ln w="38100">
-                <a:solidFill>
-                  <a:schemeClr val="bg1">
-                    <a:lumMod val="75000"/>
-                  </a:schemeClr>
-                </a:solidFill>
-              </a:ln>
-            </p:spPr>
-            <p:style>
-              <a:lnRef idx="2">
-                <a:schemeClr val="accent1">
-                  <a:shade val="50000"/>
-                </a:schemeClr>
-              </a:lnRef>
-              <a:fillRef idx="1">
-                <a:schemeClr val="accent1"/>
-              </a:fillRef>
-              <a:effectRef idx="0">
-                <a:schemeClr val="accent1"/>
-              </a:effectRef>
-              <a:fontRef idx="minor">
-                <a:schemeClr val="lt1"/>
-              </a:fontRef>
-            </p:style>
-            <p:txBody>
-              <a:bodyPr rtlCol="0" anchor="ctr"/>
-              <a:lstStyle/>
-              <a:p>
-                <a:pPr algn="ctr"/>
-                <a:endParaRPr lang="en-US"/>
-              </a:p>
-            </p:txBody>
-          </p:sp>
-          <p:grpSp>
-            <p:nvGrpSpPr>
-              <p:cNvPr id="10" name="Group 9">
-                <a:extLst>
-                  <a:ext uri="{FF2B5EF4-FFF2-40B4-BE49-F238E27FC236}">
-                    <a16:creationId xmlns:a16="http://schemas.microsoft.com/office/drawing/2014/main" id="{3A5155E9-BFD6-4878-B392-0326ABAF12B8}"/>
+                    <a16:creationId xmlns:a16="http://schemas.microsoft.com/office/drawing/2014/main" id="{6C52C2BA-6090-403E-9F8F-5486319FEE12}"/>
                   </a:ext>
                 </a:extLst>
               </p:cNvPr>
@@ -3566,18 +3508,76 @@
             </p:nvGrpSpPr>
             <p:grpSpPr>
               <a:xfrm>
-                <a:off x="635635" y="2514600"/>
-                <a:ext cx="1558607" cy="914400"/>
-                <a:chOff x="1188085" y="2514600"/>
-                <a:chExt cx="1558607" cy="914400"/>
+                <a:off x="635635" y="802640"/>
+                <a:ext cx="10920730" cy="4857750"/>
+                <a:chOff x="635635" y="802640"/>
+                <a:chExt cx="10920730" cy="4857750"/>
               </a:xfrm>
             </p:grpSpPr>
+            <p:sp>
+              <p:nvSpPr>
+                <p:cNvPr id="4" name="Rectangle: Rounded Corners 3">
+                  <a:extLst>
+                    <a:ext uri="{FF2B5EF4-FFF2-40B4-BE49-F238E27FC236}">
+                      <a16:creationId xmlns:a16="http://schemas.microsoft.com/office/drawing/2014/main" id="{94BB7528-F274-4A12-AD63-6689E3636CED}"/>
+                    </a:ext>
+                  </a:extLst>
+                </p:cNvPr>
+                <p:cNvSpPr/>
+                <p:nvPr/>
+              </p:nvSpPr>
+              <p:spPr>
+                <a:xfrm>
+                  <a:off x="2341402" y="802640"/>
+                  <a:ext cx="7978458" cy="4857750"/>
+                </a:xfrm>
+                <a:prstGeom prst="roundRect">
+                  <a:avLst/>
+                </a:prstGeom>
+                <a:solidFill>
+                  <a:schemeClr val="bg1">
+                    <a:lumMod val="95000"/>
+                  </a:schemeClr>
+                </a:solidFill>
+                <a:ln w="38100">
+                  <a:solidFill>
+                    <a:schemeClr val="bg1">
+                      <a:lumMod val="75000"/>
+                    </a:schemeClr>
+                  </a:solidFill>
+                </a:ln>
+              </p:spPr>
+              <p:style>
+                <a:lnRef idx="2">
+                  <a:schemeClr val="accent1">
+                    <a:shade val="50000"/>
+                  </a:schemeClr>
+                </a:lnRef>
+                <a:fillRef idx="1">
+                  <a:schemeClr val="accent1"/>
+                </a:fillRef>
+                <a:effectRef idx="0">
+                  <a:schemeClr val="accent1"/>
+                </a:effectRef>
+                <a:fontRef idx="minor">
+                  <a:schemeClr val="lt1"/>
+                </a:fontRef>
+              </p:style>
+              <p:txBody>
+                <a:bodyPr rtlCol="0" anchor="ctr"/>
+                <a:lstStyle/>
+                <a:p>
+                  <a:pPr algn="ctr"/>
+                  <a:endParaRPr lang="en-US"/>
+                </a:p>
+              </p:txBody>
+            </p:sp>
             <p:grpSp>
               <p:nvGrpSpPr>
-                <p:cNvPr id="9" name="Group 8">
+                <p:cNvPr id="10" name="Group 9">
                   <a:extLst>
                     <a:ext uri="{FF2B5EF4-FFF2-40B4-BE49-F238E27FC236}">
-                      <a16:creationId xmlns:a16="http://schemas.microsoft.com/office/drawing/2014/main" id="{4DBC64E0-BCB7-411E-B994-063E3E77DB2B}"/>
+                      <a16:creationId xmlns:a16="http://schemas.microsoft.com/office/drawing/2014/main" id="{3A5155E9-BFD6-4878-B392-0326ABAF12B8}"/>
                     </a:ext>
                   </a:extLst>
                 </p:cNvPr>
@@ -3586,882 +3586,945 @@
               </p:nvGrpSpPr>
               <p:grpSpPr>
                 <a:xfrm>
-                  <a:off x="1188085" y="2514600"/>
+                  <a:off x="635635" y="2514600"/>
                   <a:ext cx="1558607" cy="914400"/>
-                  <a:chOff x="845185" y="2774315"/>
+                  <a:chOff x="1188085" y="2514600"/>
                   <a:chExt cx="1558607" cy="914400"/>
                 </a:xfrm>
               </p:grpSpPr>
+              <p:grpSp>
+                <p:nvGrpSpPr>
+                  <p:cNvPr id="9" name="Group 8">
+                    <a:extLst>
+                      <a:ext uri="{FF2B5EF4-FFF2-40B4-BE49-F238E27FC236}">
+                        <a16:creationId xmlns:a16="http://schemas.microsoft.com/office/drawing/2014/main" id="{4DBC64E0-BCB7-411E-B994-063E3E77DB2B}"/>
+                      </a:ext>
+                    </a:extLst>
+                  </p:cNvPr>
+                  <p:cNvGrpSpPr/>
+                  <p:nvPr/>
+                </p:nvGrpSpPr>
+                <p:grpSpPr>
+                  <a:xfrm>
+                    <a:off x="1188085" y="2514600"/>
+                    <a:ext cx="1558607" cy="914400"/>
+                    <a:chOff x="845185" y="2774315"/>
+                    <a:chExt cx="1558607" cy="914400"/>
+                  </a:xfrm>
+                </p:grpSpPr>
+                <p:pic>
+                  <p:nvPicPr>
+                    <p:cNvPr id="6" name="Graphic 5" descr="Smart Phone">
+                      <a:extLst>
+                        <a:ext uri="{FF2B5EF4-FFF2-40B4-BE49-F238E27FC236}">
+                          <a16:creationId xmlns:a16="http://schemas.microsoft.com/office/drawing/2014/main" id="{A258B0F3-9512-48EB-A7C1-4826EBD5771C}"/>
+                        </a:ext>
+                      </a:extLst>
+                    </p:cNvPr>
+                    <p:cNvPicPr>
+                      <a:picLocks noChangeAspect="1"/>
+                    </p:cNvPicPr>
+                    <p:nvPr/>
+                  </p:nvPicPr>
+                  <p:blipFill>
+                    <a:blip r:embed="rId2">
+                      <a:extLst>
+                        <a:ext uri="{28A0092B-C50C-407E-A947-70E740481C1C}">
+                          <a14:useLocalDpi xmlns:a14="http://schemas.microsoft.com/office/drawing/2010/main" val="0"/>
+                        </a:ext>
+                        <a:ext uri="{96DAC541-7B7A-43D3-8B79-37D633B846F1}">
+                          <asvg:svgBlip xmlns:asvg="http://schemas.microsoft.com/office/drawing/2016/SVG/main" r:embed="rId3"/>
+                        </a:ext>
+                      </a:extLst>
+                    </a:blip>
+                    <a:stretch>
+                      <a:fillRect/>
+                    </a:stretch>
+                  </p:blipFill>
+                  <p:spPr>
+                    <a:xfrm>
+                      <a:off x="1489392" y="2774315"/>
+                      <a:ext cx="914400" cy="914400"/>
+                    </a:xfrm>
+                    <a:prstGeom prst="rect">
+                      <a:avLst/>
+                    </a:prstGeom>
+                  </p:spPr>
+                </p:pic>
+                <p:pic>
+                  <p:nvPicPr>
+                    <p:cNvPr id="8" name="Graphic 7" descr="User">
+                      <a:extLst>
+                        <a:ext uri="{FF2B5EF4-FFF2-40B4-BE49-F238E27FC236}">
+                          <a16:creationId xmlns:a16="http://schemas.microsoft.com/office/drawing/2014/main" id="{847A726A-277A-4EA8-A37C-1E5E5F728881}"/>
+                        </a:ext>
+                      </a:extLst>
+                    </p:cNvPr>
+                    <p:cNvPicPr>
+                      <a:picLocks noChangeAspect="1"/>
+                    </p:cNvPicPr>
+                    <p:nvPr/>
+                  </p:nvPicPr>
+                  <p:blipFill>
+                    <a:blip r:embed="rId4">
+                      <a:extLst>
+                        <a:ext uri="{28A0092B-C50C-407E-A947-70E740481C1C}">
+                          <a14:useLocalDpi xmlns:a14="http://schemas.microsoft.com/office/drawing/2010/main" val="0"/>
+                        </a:ext>
+                        <a:ext uri="{96DAC541-7B7A-43D3-8B79-37D633B846F1}">
+                          <asvg:svgBlip xmlns:asvg="http://schemas.microsoft.com/office/drawing/2016/SVG/main" r:embed="rId5"/>
+                        </a:ext>
+                      </a:extLst>
+                    </a:blip>
+                    <a:stretch>
+                      <a:fillRect/>
+                    </a:stretch>
+                  </p:blipFill>
+                  <p:spPr>
+                    <a:xfrm>
+                      <a:off x="845185" y="2774315"/>
+                      <a:ext cx="914400" cy="914400"/>
+                    </a:xfrm>
+                    <a:prstGeom prst="rect">
+                      <a:avLst/>
+                    </a:prstGeom>
+                  </p:spPr>
+                </p:pic>
+              </p:grpSp>
               <p:pic>
                 <p:nvPicPr>
-                  <p:cNvPr id="6" name="Graphic 5" descr="Smart Phone">
+                  <p:cNvPr id="1026" name="Picture 2" descr="http://gtalogo.com/img/4897.png">
                     <a:extLst>
                       <a:ext uri="{FF2B5EF4-FFF2-40B4-BE49-F238E27FC236}">
-                        <a16:creationId xmlns:a16="http://schemas.microsoft.com/office/drawing/2014/main" id="{A258B0F3-9512-48EB-A7C1-4826EBD5771C}"/>
+                        <a16:creationId xmlns:a16="http://schemas.microsoft.com/office/drawing/2014/main" id="{A050B865-ED49-4860-B7E6-CC7830260E40}"/>
                       </a:ext>
                     </a:extLst>
                   </p:cNvPr>
                   <p:cNvPicPr>
-                    <a:picLocks noChangeAspect="1"/>
+                    <a:picLocks noChangeAspect="1" noChangeArrowheads="1"/>
                   </p:cNvPicPr>
                   <p:nvPr/>
                 </p:nvPicPr>
                 <p:blipFill>
-                  <a:blip r:embed="rId2">
+                  <a:blip r:embed="rId6">
                     <a:extLst>
                       <a:ext uri="{28A0092B-C50C-407E-A947-70E740481C1C}">
                         <a14:useLocalDpi xmlns:a14="http://schemas.microsoft.com/office/drawing/2010/main" val="0"/>
                       </a:ext>
-                      <a:ext uri="{96DAC541-7B7A-43D3-8B79-37D633B846F1}">
-                        <asvg:svgBlip xmlns:asvg="http://schemas.microsoft.com/office/drawing/2016/SVG/main" r:embed="rId3"/>
-                      </a:ext>
                     </a:extLst>
                   </a:blip>
+                  <a:srcRect/>
                   <a:stretch>
                     <a:fillRect/>
                   </a:stretch>
                 </p:blipFill>
-                <p:spPr>
+                <p:spPr bwMode="auto">
                   <a:xfrm>
-                    <a:off x="1489392" y="2774315"/>
-                    <a:ext cx="914400" cy="914400"/>
+                    <a:off x="2102485" y="2849245"/>
+                    <a:ext cx="382270" cy="382270"/>
                   </a:xfrm>
                   <a:prstGeom prst="rect">
                     <a:avLst/>
                   </a:prstGeom>
-                </p:spPr>
-              </p:pic>
-              <p:pic>
-                <p:nvPicPr>
-                  <p:cNvPr id="8" name="Graphic 7" descr="User">
-                    <a:extLst>
-                      <a:ext uri="{FF2B5EF4-FFF2-40B4-BE49-F238E27FC236}">
-                        <a16:creationId xmlns:a16="http://schemas.microsoft.com/office/drawing/2014/main" id="{847A726A-277A-4EA8-A37C-1E5E5F728881}"/>
-                      </a:ext>
-                    </a:extLst>
-                  </p:cNvPr>
-                  <p:cNvPicPr>
-                    <a:picLocks noChangeAspect="1"/>
-                  </p:cNvPicPr>
-                  <p:nvPr/>
-                </p:nvPicPr>
-                <p:blipFill>
-                  <a:blip r:embed="rId4">
-                    <a:extLst>
-                      <a:ext uri="{28A0092B-C50C-407E-A947-70E740481C1C}">
-                        <a14:useLocalDpi xmlns:a14="http://schemas.microsoft.com/office/drawing/2010/main" val="0"/>
-                      </a:ext>
-                      <a:ext uri="{96DAC541-7B7A-43D3-8B79-37D633B846F1}">
-                        <asvg:svgBlip xmlns:asvg="http://schemas.microsoft.com/office/drawing/2016/SVG/main" r:embed="rId5"/>
-                      </a:ext>
-                    </a:extLst>
-                  </a:blip>
-                  <a:stretch>
-                    <a:fillRect/>
-                  </a:stretch>
-                </p:blipFill>
-                <p:spPr>
-                  <a:xfrm>
-                    <a:off x="845185" y="2774315"/>
-                    <a:ext cx="914400" cy="914400"/>
-                  </a:xfrm>
-                  <a:prstGeom prst="rect">
-                    <a:avLst/>
-                  </a:prstGeom>
+                  <a:noFill/>
+                  <a:extLst>
+                    <a:ext uri="{909E8E84-426E-40DD-AFC4-6F175D3DCCD1}">
+                      <a14:hiddenFill xmlns:a14="http://schemas.microsoft.com/office/drawing/2010/main">
+                        <a:solidFill>
+                          <a:srgbClr val="FFFFFF"/>
+                        </a:solidFill>
+                      </a14:hiddenFill>
+                    </a:ext>
+                  </a:extLst>
                 </p:spPr>
               </p:pic>
             </p:grpSp>
+            <p:sp>
+              <p:nvSpPr>
+                <p:cNvPr id="11" name="Rectangle: Rounded Corners 10">
+                  <a:extLst>
+                    <a:ext uri="{FF2B5EF4-FFF2-40B4-BE49-F238E27FC236}">
+                      <a16:creationId xmlns:a16="http://schemas.microsoft.com/office/drawing/2014/main" id="{C7F778B8-12CD-4E85-B3FB-2B443BC56802}"/>
+                    </a:ext>
+                  </a:extLst>
+                </p:cNvPr>
+                <p:cNvSpPr/>
+                <p:nvPr/>
+              </p:nvSpPr>
+              <p:spPr>
+                <a:xfrm>
+                  <a:off x="2838449" y="1352551"/>
+                  <a:ext cx="6819901" cy="559118"/>
+                </a:xfrm>
+                <a:prstGeom prst="roundRect">
+                  <a:avLst/>
+                </a:prstGeom>
+                <a:solidFill>
+                  <a:srgbClr val="00B050"/>
+                </a:solidFill>
+                <a:ln>
+                  <a:noFill/>
+                </a:ln>
+              </p:spPr>
+              <p:style>
+                <a:lnRef idx="2">
+                  <a:schemeClr val="accent1">
+                    <a:shade val="50000"/>
+                  </a:schemeClr>
+                </a:lnRef>
+                <a:fillRef idx="1">
+                  <a:schemeClr val="accent1"/>
+                </a:fillRef>
+                <a:effectRef idx="0">
+                  <a:schemeClr val="accent1"/>
+                </a:effectRef>
+                <a:fontRef idx="minor">
+                  <a:schemeClr val="lt1"/>
+                </a:fontRef>
+              </p:style>
+              <p:txBody>
+                <a:bodyPr rtlCol="0" anchor="ctr"/>
+                <a:lstStyle/>
+                <a:p>
+                  <a:pPr algn="ctr"/>
+                  <a:r>
+                    <a:rPr lang="en-US" dirty="0"/>
+                    <a:t>Routes</a:t>
+                  </a:r>
+                </a:p>
+              </p:txBody>
+            </p:sp>
+            <p:cxnSp>
+              <p:nvCxnSpPr>
+                <p:cNvPr id="13" name="Connector: Elbow 12">
+                  <a:extLst>
+                    <a:ext uri="{FF2B5EF4-FFF2-40B4-BE49-F238E27FC236}">
+                      <a16:creationId xmlns:a16="http://schemas.microsoft.com/office/drawing/2014/main" id="{C239D358-BE99-446C-9D1B-F2998EB98887}"/>
+                    </a:ext>
+                  </a:extLst>
+                </p:cNvPr>
+                <p:cNvCxnSpPr>
+                  <a:cxnSpLocks/>
+                </p:cNvCxnSpPr>
+                <p:nvPr/>
+              </p:nvCxnSpPr>
+              <p:spPr>
+                <a:xfrm rot="5400000" flipH="1" flipV="1">
+                  <a:off x="1846501" y="1522652"/>
+                  <a:ext cx="882490" cy="1101407"/>
+                </a:xfrm>
+                <a:prstGeom prst="bentConnector2">
+                  <a:avLst/>
+                </a:prstGeom>
+                <a:ln w="28575">
+                  <a:tailEnd type="triangle"/>
+                </a:ln>
+              </p:spPr>
+              <p:style>
+                <a:lnRef idx="1">
+                  <a:schemeClr val="accent1"/>
+                </a:lnRef>
+                <a:fillRef idx="0">
+                  <a:schemeClr val="accent1"/>
+                </a:fillRef>
+                <a:effectRef idx="0">
+                  <a:schemeClr val="accent1"/>
+                </a:effectRef>
+                <a:fontRef idx="minor">
+                  <a:schemeClr val="tx1"/>
+                </a:fontRef>
+              </p:style>
+            </p:cxnSp>
+            <p:sp>
+              <p:nvSpPr>
+                <p:cNvPr id="16" name="Rectangle: Rounded Corners 15">
+                  <a:extLst>
+                    <a:ext uri="{FF2B5EF4-FFF2-40B4-BE49-F238E27FC236}">
+                      <a16:creationId xmlns:a16="http://schemas.microsoft.com/office/drawing/2014/main" id="{6DCDB54B-B516-482F-BE92-7F6815B7025E}"/>
+                    </a:ext>
+                  </a:extLst>
+                </p:cNvPr>
+                <p:cNvSpPr/>
+                <p:nvPr/>
+              </p:nvSpPr>
+              <p:spPr>
+                <a:xfrm>
+                  <a:off x="2838449" y="2514600"/>
+                  <a:ext cx="6819900" cy="565467"/>
+                </a:xfrm>
+                <a:prstGeom prst="roundRect">
+                  <a:avLst/>
+                </a:prstGeom>
+                <a:solidFill>
+                  <a:srgbClr val="C00000"/>
+                </a:solidFill>
+                <a:ln>
+                  <a:noFill/>
+                </a:ln>
+              </p:spPr>
+              <p:style>
+                <a:lnRef idx="2">
+                  <a:schemeClr val="accent1">
+                    <a:shade val="50000"/>
+                  </a:schemeClr>
+                </a:lnRef>
+                <a:fillRef idx="1">
+                  <a:schemeClr val="accent1"/>
+                </a:fillRef>
+                <a:effectRef idx="0">
+                  <a:schemeClr val="accent1"/>
+                </a:effectRef>
+                <a:fontRef idx="minor">
+                  <a:schemeClr val="lt1"/>
+                </a:fontRef>
+              </p:style>
+              <p:txBody>
+                <a:bodyPr rtlCol="0" anchor="ctr"/>
+                <a:lstStyle/>
+                <a:p>
+                  <a:pPr algn="ctr"/>
+                  <a:r>
+                    <a:rPr lang="en-US" dirty="0"/>
+                    <a:t>Handlers</a:t>
+                  </a:r>
+                </a:p>
+              </p:txBody>
+            </p:sp>
+            <p:sp>
+              <p:nvSpPr>
+                <p:cNvPr id="17" name="Rectangle: Rounded Corners 16">
+                  <a:extLst>
+                    <a:ext uri="{FF2B5EF4-FFF2-40B4-BE49-F238E27FC236}">
+                      <a16:creationId xmlns:a16="http://schemas.microsoft.com/office/drawing/2014/main" id="{3681F12A-F85E-4913-9D96-0F94962AA9FD}"/>
+                    </a:ext>
+                  </a:extLst>
+                </p:cNvPr>
+                <p:cNvSpPr/>
+                <p:nvPr/>
+              </p:nvSpPr>
+              <p:spPr>
+                <a:xfrm>
+                  <a:off x="2838449" y="4657725"/>
+                  <a:ext cx="6819900" cy="559118"/>
+                </a:xfrm>
+                <a:prstGeom prst="roundRect">
+                  <a:avLst/>
+                </a:prstGeom>
+                <a:solidFill>
+                  <a:srgbClr val="0070C0"/>
+                </a:solidFill>
+                <a:ln>
+                  <a:noFill/>
+                </a:ln>
+              </p:spPr>
+              <p:style>
+                <a:lnRef idx="2">
+                  <a:schemeClr val="accent1">
+                    <a:shade val="50000"/>
+                  </a:schemeClr>
+                </a:lnRef>
+                <a:fillRef idx="1">
+                  <a:schemeClr val="accent1"/>
+                </a:fillRef>
+                <a:effectRef idx="0">
+                  <a:schemeClr val="accent1"/>
+                </a:effectRef>
+                <a:fontRef idx="minor">
+                  <a:schemeClr val="lt1"/>
+                </a:fontRef>
+              </p:style>
+              <p:txBody>
+                <a:bodyPr rtlCol="0" anchor="ctr"/>
+                <a:lstStyle/>
+                <a:p>
+                  <a:pPr algn="ctr"/>
+                  <a:r>
+                    <a:rPr lang="en-US" dirty="0"/>
+                    <a:t>API Caller</a:t>
+                  </a:r>
+                </a:p>
+              </p:txBody>
+            </p:sp>
+            <p:cxnSp>
+              <p:nvCxnSpPr>
+                <p:cNvPr id="18" name="Connector: Elbow 17">
+                  <a:extLst>
+                    <a:ext uri="{FF2B5EF4-FFF2-40B4-BE49-F238E27FC236}">
+                      <a16:creationId xmlns:a16="http://schemas.microsoft.com/office/drawing/2014/main" id="{802AF58B-DC51-4C0A-85DB-4145903C4A47}"/>
+                    </a:ext>
+                  </a:extLst>
+                </p:cNvPr>
+                <p:cNvCxnSpPr>
+                  <a:cxnSpLocks/>
+                  <a:stCxn id="17" idx="1"/>
+                  <a:endCxn id="6" idx="2"/>
+                </p:cNvCxnSpPr>
+                <p:nvPr/>
+              </p:nvCxnSpPr>
+              <p:spPr>
+                <a:xfrm rot="10800000">
+                  <a:off x="1737043" y="3429000"/>
+                  <a:ext cx="1101407" cy="1508284"/>
+                </a:xfrm>
+                <a:prstGeom prst="bentConnector2">
+                  <a:avLst/>
+                </a:prstGeom>
+                <a:ln w="28575">
+                  <a:tailEnd type="triangle"/>
+                </a:ln>
+              </p:spPr>
+              <p:style>
+                <a:lnRef idx="1">
+                  <a:schemeClr val="accent1"/>
+                </a:lnRef>
+                <a:fillRef idx="0">
+                  <a:schemeClr val="accent1"/>
+                </a:fillRef>
+                <a:effectRef idx="0">
+                  <a:schemeClr val="accent1"/>
+                </a:effectRef>
+                <a:fontRef idx="minor">
+                  <a:schemeClr val="tx1"/>
+                </a:fontRef>
+              </p:style>
+            </p:cxnSp>
             <p:pic>
               <p:nvPicPr>
-                <p:cNvPr id="1026" name="Picture 2" descr="http://gtalogo.com/img/4897.png">
+                <p:cNvPr id="21" name="Graphic 20" descr="Database">
                   <a:extLst>
                     <a:ext uri="{FF2B5EF4-FFF2-40B4-BE49-F238E27FC236}">
-                      <a16:creationId xmlns:a16="http://schemas.microsoft.com/office/drawing/2014/main" id="{A050B865-ED49-4860-B7E6-CC7830260E40}"/>
+                      <a16:creationId xmlns:a16="http://schemas.microsoft.com/office/drawing/2014/main" id="{4A12E6E2-A94D-47BE-980E-2C46D7BBE4BF}"/>
                     </a:ext>
                   </a:extLst>
                 </p:cNvPr>
                 <p:cNvPicPr>
-                  <a:picLocks noChangeAspect="1" noChangeArrowheads="1"/>
+                  <a:picLocks noChangeAspect="1"/>
                 </p:cNvPicPr>
                 <p:nvPr/>
               </p:nvPicPr>
               <p:blipFill>
-                <a:blip r:embed="rId6">
+                <a:blip r:embed="rId7">
                   <a:extLst>
                     <a:ext uri="{28A0092B-C50C-407E-A947-70E740481C1C}">
                       <a14:useLocalDpi xmlns:a14="http://schemas.microsoft.com/office/drawing/2010/main" val="0"/>
                     </a:ext>
+                    <a:ext uri="{96DAC541-7B7A-43D3-8B79-37D633B846F1}">
+                      <asvg:svgBlip xmlns:asvg="http://schemas.microsoft.com/office/drawing/2016/SVG/main" r:embed="rId8"/>
+                    </a:ext>
                   </a:extLst>
                 </a:blip>
-                <a:srcRect/>
                 <a:stretch>
                   <a:fillRect/>
                 </a:stretch>
               </p:blipFill>
-              <p:spPr bwMode="auto">
+              <p:spPr>
                 <a:xfrm>
-                  <a:off x="2102485" y="2849245"/>
-                  <a:ext cx="382270" cy="382270"/>
+                  <a:off x="10641965" y="2514600"/>
+                  <a:ext cx="914400" cy="914400"/>
                 </a:xfrm>
                 <a:prstGeom prst="rect">
                   <a:avLst/>
                 </a:prstGeom>
-                <a:noFill/>
-                <a:extLst>
-                  <a:ext uri="{909E8E84-426E-40DD-AFC4-6F175D3DCCD1}">
-                    <a14:hiddenFill xmlns:a14="http://schemas.microsoft.com/office/drawing/2010/main">
-                      <a:solidFill>
-                        <a:srgbClr val="FFFFFF"/>
-                      </a:solidFill>
-                    </a14:hiddenFill>
-                  </a:ext>
-                </a:extLst>
               </p:spPr>
             </p:pic>
+            <p:cxnSp>
+              <p:nvCxnSpPr>
+                <p:cNvPr id="23" name="Connector: Elbow 22">
+                  <a:extLst>
+                    <a:ext uri="{FF2B5EF4-FFF2-40B4-BE49-F238E27FC236}">
+                      <a16:creationId xmlns:a16="http://schemas.microsoft.com/office/drawing/2014/main" id="{6B8CA8DA-A575-48D8-AE97-55F82B23CEA8}"/>
+                    </a:ext>
+                  </a:extLst>
+                </p:cNvPr>
+                <p:cNvCxnSpPr>
+                  <a:cxnSpLocks/>
+                  <a:stCxn id="17" idx="3"/>
+                  <a:endCxn id="21" idx="2"/>
+                </p:cNvCxnSpPr>
+                <p:nvPr/>
+              </p:nvCxnSpPr>
+              <p:spPr>
+                <a:xfrm flipV="1">
+                  <a:off x="9658349" y="3429000"/>
+                  <a:ext cx="1440816" cy="1508284"/>
+                </a:xfrm>
+                <a:prstGeom prst="bentConnector2">
+                  <a:avLst/>
+                </a:prstGeom>
+                <a:ln w="28575">
+                  <a:tailEnd type="triangle"/>
+                </a:ln>
+              </p:spPr>
+              <p:style>
+                <a:lnRef idx="1">
+                  <a:schemeClr val="accent1"/>
+                </a:lnRef>
+                <a:fillRef idx="0">
+                  <a:schemeClr val="accent1"/>
+                </a:fillRef>
+                <a:effectRef idx="0">
+                  <a:schemeClr val="accent1"/>
+                </a:effectRef>
+                <a:fontRef idx="minor">
+                  <a:schemeClr val="tx1"/>
+                </a:fontRef>
+              </p:style>
+            </p:cxnSp>
+            <p:cxnSp>
+              <p:nvCxnSpPr>
+                <p:cNvPr id="38" name="Connector: Elbow 37">
+                  <a:extLst>
+                    <a:ext uri="{FF2B5EF4-FFF2-40B4-BE49-F238E27FC236}">
+                      <a16:creationId xmlns:a16="http://schemas.microsoft.com/office/drawing/2014/main" id="{50E73AB1-6F6F-4C02-B281-53C5EC71857C}"/>
+                    </a:ext>
+                  </a:extLst>
+                </p:cNvPr>
+                <p:cNvCxnSpPr>
+                  <a:cxnSpLocks/>
+                  <a:stCxn id="21" idx="0"/>
+                  <a:endCxn id="11" idx="3"/>
+                </p:cNvCxnSpPr>
+                <p:nvPr/>
+              </p:nvCxnSpPr>
+              <p:spPr>
+                <a:xfrm rot="16200000" flipV="1">
+                  <a:off x="9937513" y="1352947"/>
+                  <a:ext cx="882490" cy="1440815"/>
+                </a:xfrm>
+                <a:prstGeom prst="bentConnector2">
+                  <a:avLst/>
+                </a:prstGeom>
+                <a:ln w="28575">
+                  <a:tailEnd type="triangle"/>
+                </a:ln>
+              </p:spPr>
+              <p:style>
+                <a:lnRef idx="1">
+                  <a:schemeClr val="accent1"/>
+                </a:lnRef>
+                <a:fillRef idx="0">
+                  <a:schemeClr val="accent1"/>
+                </a:fillRef>
+                <a:effectRef idx="0">
+                  <a:schemeClr val="accent1"/>
+                </a:effectRef>
+                <a:fontRef idx="minor">
+                  <a:schemeClr val="tx1"/>
+                </a:fontRef>
+              </p:style>
+            </p:cxnSp>
+            <p:cxnSp>
+              <p:nvCxnSpPr>
+                <p:cNvPr id="1033" name="Straight Arrow Connector 1032">
+                  <a:extLst>
+                    <a:ext uri="{FF2B5EF4-FFF2-40B4-BE49-F238E27FC236}">
+                      <a16:creationId xmlns:a16="http://schemas.microsoft.com/office/drawing/2014/main" id="{7F9C91E8-C603-437B-A044-7BE950618458}"/>
+                    </a:ext>
+                  </a:extLst>
+                </p:cNvPr>
+                <p:cNvCxnSpPr>
+                  <a:stCxn id="11" idx="2"/>
+                  <a:endCxn id="16" idx="0"/>
+                </p:cNvCxnSpPr>
+                <p:nvPr/>
+              </p:nvCxnSpPr>
+              <p:spPr>
+                <a:xfrm flipH="1">
+                  <a:off x="6248399" y="1911669"/>
+                  <a:ext cx="1" cy="602931"/>
+                </a:xfrm>
+                <a:prstGeom prst="straightConnector1">
+                  <a:avLst/>
+                </a:prstGeom>
+                <a:ln w="28575">
+                  <a:tailEnd type="triangle"/>
+                </a:ln>
+              </p:spPr>
+              <p:style>
+                <a:lnRef idx="1">
+                  <a:schemeClr val="accent1"/>
+                </a:lnRef>
+                <a:fillRef idx="0">
+                  <a:schemeClr val="accent1"/>
+                </a:fillRef>
+                <a:effectRef idx="0">
+                  <a:schemeClr val="accent1"/>
+                </a:effectRef>
+                <a:fontRef idx="minor">
+                  <a:schemeClr val="tx1"/>
+                </a:fontRef>
+              </p:style>
+            </p:cxnSp>
+            <p:sp>
+              <p:nvSpPr>
+                <p:cNvPr id="43" name="Rectangle: Rounded Corners 42">
+                  <a:extLst>
+                    <a:ext uri="{FF2B5EF4-FFF2-40B4-BE49-F238E27FC236}">
+                      <a16:creationId xmlns:a16="http://schemas.microsoft.com/office/drawing/2014/main" id="{1A6CAD6F-C4B7-4D13-8E04-EA5932E46B51}"/>
+                    </a:ext>
+                  </a:extLst>
+                </p:cNvPr>
+                <p:cNvSpPr/>
+                <p:nvPr/>
+              </p:nvSpPr>
+              <p:spPr>
+                <a:xfrm>
+                  <a:off x="2838450" y="3586162"/>
+                  <a:ext cx="2676526" cy="565467"/>
+                </a:xfrm>
+                <a:prstGeom prst="roundRect">
+                  <a:avLst/>
+                </a:prstGeom>
+                <a:solidFill>
+                  <a:srgbClr val="7030A0"/>
+                </a:solidFill>
+                <a:ln>
+                  <a:noFill/>
+                </a:ln>
+              </p:spPr>
+              <p:style>
+                <a:lnRef idx="2">
+                  <a:schemeClr val="accent1">
+                    <a:shade val="50000"/>
+                  </a:schemeClr>
+                </a:lnRef>
+                <a:fillRef idx="1">
+                  <a:schemeClr val="accent1"/>
+                </a:fillRef>
+                <a:effectRef idx="0">
+                  <a:schemeClr val="accent1"/>
+                </a:effectRef>
+                <a:fontRef idx="minor">
+                  <a:schemeClr val="lt1"/>
+                </a:fontRef>
+              </p:style>
+              <p:txBody>
+                <a:bodyPr rtlCol="0" anchor="ctr"/>
+                <a:lstStyle/>
+                <a:p>
+                  <a:pPr algn="ctr"/>
+                  <a:r>
+                    <a:rPr lang="en-US" dirty="0"/>
+                    <a:t>Cache</a:t>
+                  </a:r>
+                </a:p>
+              </p:txBody>
+            </p:sp>
+            <p:sp>
+              <p:nvSpPr>
+                <p:cNvPr id="44" name="Rectangle: Rounded Corners 43">
+                  <a:extLst>
+                    <a:ext uri="{FF2B5EF4-FFF2-40B4-BE49-F238E27FC236}">
+                      <a16:creationId xmlns:a16="http://schemas.microsoft.com/office/drawing/2014/main" id="{EBB3025D-BBE2-454D-8EE9-B380E8953599}"/>
+                    </a:ext>
+                  </a:extLst>
+                </p:cNvPr>
+                <p:cNvSpPr/>
+                <p:nvPr/>
+              </p:nvSpPr>
+              <p:spPr>
+                <a:xfrm>
+                  <a:off x="6981823" y="3586162"/>
+                  <a:ext cx="2676526" cy="565467"/>
+                </a:xfrm>
+                <a:prstGeom prst="roundRect">
+                  <a:avLst/>
+                </a:prstGeom>
+                <a:solidFill>
+                  <a:schemeClr val="accent4"/>
+                </a:solidFill>
+                <a:ln>
+                  <a:noFill/>
+                </a:ln>
+              </p:spPr>
+              <p:style>
+                <a:lnRef idx="2">
+                  <a:schemeClr val="accent1">
+                    <a:shade val="50000"/>
+                  </a:schemeClr>
+                </a:lnRef>
+                <a:fillRef idx="1">
+                  <a:schemeClr val="accent1"/>
+                </a:fillRef>
+                <a:effectRef idx="0">
+                  <a:schemeClr val="accent1"/>
+                </a:effectRef>
+                <a:fontRef idx="minor">
+                  <a:schemeClr val="lt1"/>
+                </a:fontRef>
+              </p:style>
+              <p:txBody>
+                <a:bodyPr rtlCol="0" anchor="ctr"/>
+                <a:lstStyle/>
+                <a:p>
+                  <a:pPr algn="ctr"/>
+                  <a:r>
+                    <a:rPr lang="en-US" dirty="0"/>
+                    <a:t>Utils</a:t>
+                  </a:r>
+                </a:p>
+              </p:txBody>
+            </p:sp>
+            <p:cxnSp>
+              <p:nvCxnSpPr>
+                <p:cNvPr id="45" name="Straight Arrow Connector 44">
+                  <a:extLst>
+                    <a:ext uri="{FF2B5EF4-FFF2-40B4-BE49-F238E27FC236}">
+                      <a16:creationId xmlns:a16="http://schemas.microsoft.com/office/drawing/2014/main" id="{CBBF9E6F-8FE1-4676-B06E-FC922E4212AB}"/>
+                    </a:ext>
+                  </a:extLst>
+                </p:cNvPr>
+                <p:cNvCxnSpPr>
+                  <a:cxnSpLocks/>
+                  <a:endCxn id="43" idx="0"/>
+                </p:cNvCxnSpPr>
+                <p:nvPr/>
+              </p:nvCxnSpPr>
+              <p:spPr>
+                <a:xfrm>
+                  <a:off x="4176713" y="3080067"/>
+                  <a:ext cx="0" cy="506095"/>
+                </a:xfrm>
+                <a:prstGeom prst="straightConnector1">
+                  <a:avLst/>
+                </a:prstGeom>
+                <a:ln w="28575">
+                  <a:tailEnd type="triangle"/>
+                </a:ln>
+              </p:spPr>
+              <p:style>
+                <a:lnRef idx="1">
+                  <a:schemeClr val="accent1"/>
+                </a:lnRef>
+                <a:fillRef idx="0">
+                  <a:schemeClr val="accent1"/>
+                </a:fillRef>
+                <a:effectRef idx="0">
+                  <a:schemeClr val="accent1"/>
+                </a:effectRef>
+                <a:fontRef idx="minor">
+                  <a:schemeClr val="tx1"/>
+                </a:fontRef>
+              </p:style>
+            </p:cxnSp>
+            <p:cxnSp>
+              <p:nvCxnSpPr>
+                <p:cNvPr id="49" name="Connector: Elbow 48">
+                  <a:extLst>
+                    <a:ext uri="{FF2B5EF4-FFF2-40B4-BE49-F238E27FC236}">
+                      <a16:creationId xmlns:a16="http://schemas.microsoft.com/office/drawing/2014/main" id="{0CC2593D-D111-4B2A-9F03-9CB60347D659}"/>
+                    </a:ext>
+                  </a:extLst>
+                </p:cNvPr>
+                <p:cNvCxnSpPr>
+                  <a:cxnSpLocks/>
+                  <a:stCxn id="43" idx="1"/>
+                  <a:endCxn id="16" idx="1"/>
+                </p:cNvCxnSpPr>
+                <p:nvPr/>
+              </p:nvCxnSpPr>
+              <p:spPr>
+                <a:xfrm rot="10800000">
+                  <a:off x="2838450" y="2797334"/>
+                  <a:ext cx="1" cy="1071562"/>
+                </a:xfrm>
+                <a:prstGeom prst="bentConnector3">
+                  <a:avLst>
+                    <a:gd name="adj1" fmla="val 22860100000"/>
+                  </a:avLst>
+                </a:prstGeom>
+                <a:ln w="28575">
+                  <a:tailEnd type="triangle"/>
+                </a:ln>
+              </p:spPr>
+              <p:style>
+                <a:lnRef idx="1">
+                  <a:schemeClr val="accent1"/>
+                </a:lnRef>
+                <a:fillRef idx="0">
+                  <a:schemeClr val="accent1"/>
+                </a:fillRef>
+                <a:effectRef idx="0">
+                  <a:schemeClr val="accent1"/>
+                </a:effectRef>
+                <a:fontRef idx="minor">
+                  <a:schemeClr val="tx1"/>
+                </a:fontRef>
+              </p:style>
+            </p:cxnSp>
+            <p:cxnSp>
+              <p:nvCxnSpPr>
+                <p:cNvPr id="52" name="Connector: Elbow 51">
+                  <a:extLst>
+                    <a:ext uri="{FF2B5EF4-FFF2-40B4-BE49-F238E27FC236}">
+                      <a16:creationId xmlns:a16="http://schemas.microsoft.com/office/drawing/2014/main" id="{F79E9DF1-7B81-4831-AB96-D0763CA2F645}"/>
+                    </a:ext>
+                  </a:extLst>
+                </p:cNvPr>
+                <p:cNvCxnSpPr>
+                  <a:cxnSpLocks/>
+                  <a:stCxn id="44" idx="3"/>
+                  <a:endCxn id="16" idx="3"/>
+                </p:cNvCxnSpPr>
+                <p:nvPr/>
+              </p:nvCxnSpPr>
+              <p:spPr>
+                <a:xfrm flipV="1">
+                  <a:off x="9658349" y="2797334"/>
+                  <a:ext cx="12700" cy="1071562"/>
+                </a:xfrm>
+                <a:prstGeom prst="bentConnector3">
+                  <a:avLst>
+                    <a:gd name="adj1" fmla="val 1800000"/>
+                  </a:avLst>
+                </a:prstGeom>
+                <a:ln w="28575">
+                  <a:tailEnd type="triangle"/>
+                </a:ln>
+              </p:spPr>
+              <p:style>
+                <a:lnRef idx="1">
+                  <a:schemeClr val="accent1"/>
+                </a:lnRef>
+                <a:fillRef idx="0">
+                  <a:schemeClr val="accent1"/>
+                </a:fillRef>
+                <a:effectRef idx="0">
+                  <a:schemeClr val="accent1"/>
+                </a:effectRef>
+                <a:fontRef idx="minor">
+                  <a:schemeClr val="tx1"/>
+                </a:fontRef>
+              </p:style>
+            </p:cxnSp>
           </p:grpSp>
           <p:sp>
             <p:nvSpPr>
-              <p:cNvPr id="11" name="Rectangle: Rounded Corners 10">
+              <p:cNvPr id="1051" name="TextBox 1050">
                 <a:extLst>
                   <a:ext uri="{FF2B5EF4-FFF2-40B4-BE49-F238E27FC236}">
-                    <a16:creationId xmlns:a16="http://schemas.microsoft.com/office/drawing/2014/main" id="{C7F778B8-12CD-4E85-B3FB-2B443BC56802}"/>
+                    <a16:creationId xmlns:a16="http://schemas.microsoft.com/office/drawing/2014/main" id="{14B83927-4080-47D8-B257-0BEECC7DB5BC}"/>
                   </a:ext>
                 </a:extLst>
               </p:cNvPr>
-              <p:cNvSpPr/>
+              <p:cNvSpPr txBox="1"/>
               <p:nvPr/>
             </p:nvSpPr>
             <p:spPr>
               <a:xfrm>
-                <a:off x="2838449" y="1352551"/>
-                <a:ext cx="6819901" cy="559118"/>
+                <a:off x="540066" y="3303320"/>
+                <a:ext cx="1162367" cy="646331"/>
               </a:xfrm>
-              <a:prstGeom prst="roundRect">
+              <a:prstGeom prst="rect">
                 <a:avLst/>
               </a:prstGeom>
-              <a:solidFill>
-                <a:srgbClr val="00B050"/>
-              </a:solidFill>
-              <a:ln>
-                <a:noFill/>
-              </a:ln>
+              <a:noFill/>
             </p:spPr>
-            <p:style>
-              <a:lnRef idx="2">
-                <a:schemeClr val="accent1">
-                  <a:shade val="50000"/>
-                </a:schemeClr>
-              </a:lnRef>
-              <a:fillRef idx="1">
-                <a:schemeClr val="accent1"/>
-              </a:fillRef>
-              <a:effectRef idx="0">
-                <a:schemeClr val="accent1"/>
-              </a:effectRef>
-              <a:fontRef idx="minor">
-                <a:schemeClr val="lt1"/>
-              </a:fontRef>
-            </p:style>
             <p:txBody>
-              <a:bodyPr rtlCol="0" anchor="ctr"/>
+              <a:bodyPr wrap="square" rtlCol="0">
+                <a:spAutoFit/>
+              </a:bodyPr>
               <a:lstStyle/>
               <a:p>
                 <a:pPr algn="ctr"/>
                 <a:r>
-                  <a:rPr lang="en-US" dirty="0"/>
-                  <a:t>Routes</a:t>
-                </a:r>
-              </a:p>
-            </p:txBody>
-          </p:sp>
-          <p:cxnSp>
-            <p:nvCxnSpPr>
-              <p:cNvPr id="13" name="Connector: Elbow 12">
-                <a:extLst>
-                  <a:ext uri="{FF2B5EF4-FFF2-40B4-BE49-F238E27FC236}">
-                    <a16:creationId xmlns:a16="http://schemas.microsoft.com/office/drawing/2014/main" id="{C239D358-BE99-446C-9D1B-F2998EB98887}"/>
-                  </a:ext>
-                </a:extLst>
-              </p:cNvPr>
-              <p:cNvCxnSpPr>
-                <a:cxnSpLocks/>
-              </p:cNvCxnSpPr>
-              <p:nvPr/>
-            </p:nvCxnSpPr>
-            <p:spPr>
-              <a:xfrm rot="5400000" flipH="1" flipV="1">
-                <a:off x="1846501" y="1522652"/>
-                <a:ext cx="882490" cy="1101407"/>
-              </a:xfrm>
-              <a:prstGeom prst="bentConnector2">
-                <a:avLst/>
-              </a:prstGeom>
-              <a:ln w="28575">
-                <a:tailEnd type="triangle"/>
-              </a:ln>
-            </p:spPr>
-            <p:style>
-              <a:lnRef idx="1">
-                <a:schemeClr val="accent1"/>
-              </a:lnRef>
-              <a:fillRef idx="0">
-                <a:schemeClr val="accent1"/>
-              </a:fillRef>
-              <a:effectRef idx="0">
-                <a:schemeClr val="accent1"/>
-              </a:effectRef>
-              <a:fontRef idx="minor">
-                <a:schemeClr val="tx1"/>
-              </a:fontRef>
-            </p:style>
-          </p:cxnSp>
-          <p:sp>
-            <p:nvSpPr>
-              <p:cNvPr id="16" name="Rectangle: Rounded Corners 15">
-                <a:extLst>
-                  <a:ext uri="{FF2B5EF4-FFF2-40B4-BE49-F238E27FC236}">
-                    <a16:creationId xmlns:a16="http://schemas.microsoft.com/office/drawing/2014/main" id="{6DCDB54B-B516-482F-BE92-7F6815B7025E}"/>
-                  </a:ext>
-                </a:extLst>
-              </p:cNvPr>
-              <p:cNvSpPr/>
-              <p:nvPr/>
-            </p:nvSpPr>
-            <p:spPr>
-              <a:xfrm>
-                <a:off x="2838449" y="2514600"/>
-                <a:ext cx="6819900" cy="565467"/>
-              </a:xfrm>
-              <a:prstGeom prst="roundRect">
-                <a:avLst/>
-              </a:prstGeom>
-              <a:solidFill>
-                <a:srgbClr val="C00000"/>
-              </a:solidFill>
-              <a:ln>
-                <a:noFill/>
-              </a:ln>
-            </p:spPr>
-            <p:style>
-              <a:lnRef idx="2">
-                <a:schemeClr val="accent1">
-                  <a:shade val="50000"/>
-                </a:schemeClr>
-              </a:lnRef>
-              <a:fillRef idx="1">
-                <a:schemeClr val="accent1"/>
-              </a:fillRef>
-              <a:effectRef idx="0">
-                <a:schemeClr val="accent1"/>
-              </a:effectRef>
-              <a:fontRef idx="minor">
-                <a:schemeClr val="lt1"/>
-              </a:fontRef>
-            </p:style>
-            <p:txBody>
-              <a:bodyPr rtlCol="0" anchor="ctr"/>
-              <a:lstStyle/>
-              <a:p>
-                <a:pPr algn="ctr"/>
-                <a:r>
-                  <a:rPr lang="en-US" dirty="0"/>
-                  <a:t>Handlers</a:t>
+                  <a:rPr lang="en-US" b="1" dirty="0">
+                    <a:solidFill>
+                      <a:schemeClr val="accent1">
+                        <a:lumMod val="75000"/>
+                      </a:schemeClr>
+                    </a:solidFill>
+                  </a:rPr>
+                  <a:t>Telegram Client</a:t>
                 </a:r>
               </a:p>
             </p:txBody>
           </p:sp>
           <p:sp>
             <p:nvSpPr>
-              <p:cNvPr id="17" name="Rectangle: Rounded Corners 16">
+              <p:cNvPr id="67" name="TextBox 66">
                 <a:extLst>
                   <a:ext uri="{FF2B5EF4-FFF2-40B4-BE49-F238E27FC236}">
-                    <a16:creationId xmlns:a16="http://schemas.microsoft.com/office/drawing/2014/main" id="{3681F12A-F85E-4913-9D96-0F94962AA9FD}"/>
+                    <a16:creationId xmlns:a16="http://schemas.microsoft.com/office/drawing/2014/main" id="{50FFA7F7-6BCF-4E78-9F57-580B87D069CE}"/>
                   </a:ext>
                 </a:extLst>
               </p:cNvPr>
-              <p:cNvSpPr/>
+              <p:cNvSpPr txBox="1"/>
               <p:nvPr/>
             </p:nvSpPr>
             <p:spPr>
               <a:xfrm>
-                <a:off x="2838449" y="4657725"/>
-                <a:ext cx="6819900" cy="559118"/>
+                <a:off x="11029633" y="3009949"/>
+                <a:ext cx="1162367" cy="646331"/>
               </a:xfrm>
-              <a:prstGeom prst="roundRect">
+              <a:prstGeom prst="rect">
                 <a:avLst/>
               </a:prstGeom>
-              <a:solidFill>
-                <a:srgbClr val="0070C0"/>
-              </a:solidFill>
-              <a:ln>
-                <a:noFill/>
-              </a:ln>
+              <a:noFill/>
             </p:spPr>
-            <p:style>
-              <a:lnRef idx="2">
-                <a:schemeClr val="accent1">
-                  <a:shade val="50000"/>
-                </a:schemeClr>
-              </a:lnRef>
-              <a:fillRef idx="1">
-                <a:schemeClr val="accent1"/>
-              </a:fillRef>
-              <a:effectRef idx="0">
-                <a:schemeClr val="accent1"/>
-              </a:effectRef>
-              <a:fontRef idx="minor">
-                <a:schemeClr val="lt1"/>
-              </a:fontRef>
-            </p:style>
             <p:txBody>
-              <a:bodyPr rtlCol="0" anchor="ctr"/>
+              <a:bodyPr wrap="square" rtlCol="0">
+                <a:spAutoFit/>
+              </a:bodyPr>
               <a:lstStyle/>
               <a:p>
                 <a:pPr algn="ctr"/>
                 <a:r>
-                  <a:rPr lang="en-US" dirty="0"/>
-                  <a:t>API Caller</a:t>
+                  <a:rPr lang="en-US" b="1" dirty="0">
+                    <a:solidFill>
+                      <a:schemeClr val="accent1">
+                        <a:lumMod val="75000"/>
+                      </a:schemeClr>
+                    </a:solidFill>
+                  </a:rPr>
+                  <a:t>Bot Platform</a:t>
                 </a:r>
               </a:p>
             </p:txBody>
           </p:sp>
-          <p:cxnSp>
-            <p:nvCxnSpPr>
-              <p:cNvPr id="18" name="Connector: Elbow 17">
-                <a:extLst>
-                  <a:ext uri="{FF2B5EF4-FFF2-40B4-BE49-F238E27FC236}">
-                    <a16:creationId xmlns:a16="http://schemas.microsoft.com/office/drawing/2014/main" id="{802AF58B-DC51-4C0A-85DB-4145903C4A47}"/>
-                  </a:ext>
-                </a:extLst>
-              </p:cNvPr>
-              <p:cNvCxnSpPr>
-                <a:cxnSpLocks/>
-                <a:stCxn id="17" idx="1"/>
-                <a:endCxn id="6" idx="2"/>
-              </p:cNvCxnSpPr>
-              <p:nvPr/>
-            </p:nvCxnSpPr>
-            <p:spPr>
-              <a:xfrm rot="10800000">
-                <a:off x="1737043" y="3429000"/>
-                <a:ext cx="1101407" cy="1508284"/>
-              </a:xfrm>
-              <a:prstGeom prst="bentConnector2">
-                <a:avLst/>
-              </a:prstGeom>
-              <a:ln w="28575">
-                <a:tailEnd type="triangle"/>
-              </a:ln>
-            </p:spPr>
-            <p:style>
-              <a:lnRef idx="1">
-                <a:schemeClr val="accent1"/>
-              </a:lnRef>
-              <a:fillRef idx="0">
-                <a:schemeClr val="accent1"/>
-              </a:fillRef>
-              <a:effectRef idx="0">
-                <a:schemeClr val="accent1"/>
-              </a:effectRef>
-              <a:fontRef idx="minor">
-                <a:schemeClr val="tx1"/>
-              </a:fontRef>
-            </p:style>
-          </p:cxnSp>
-          <p:pic>
-            <p:nvPicPr>
-              <p:cNvPr id="21" name="Graphic 20" descr="Database">
-                <a:extLst>
-                  <a:ext uri="{FF2B5EF4-FFF2-40B4-BE49-F238E27FC236}">
-                    <a16:creationId xmlns:a16="http://schemas.microsoft.com/office/drawing/2014/main" id="{4A12E6E2-A94D-47BE-980E-2C46D7BBE4BF}"/>
-                  </a:ext>
-                </a:extLst>
-              </p:cNvPr>
-              <p:cNvPicPr>
-                <a:picLocks noChangeAspect="1"/>
-              </p:cNvPicPr>
-              <p:nvPr/>
-            </p:nvPicPr>
-            <p:blipFill>
-              <a:blip r:embed="rId7">
-                <a:extLst>
-                  <a:ext uri="{28A0092B-C50C-407E-A947-70E740481C1C}">
-                    <a14:useLocalDpi xmlns:a14="http://schemas.microsoft.com/office/drawing/2010/main" val="0"/>
-                  </a:ext>
-                  <a:ext uri="{96DAC541-7B7A-43D3-8B79-37D633B846F1}">
-                    <asvg:svgBlip xmlns:asvg="http://schemas.microsoft.com/office/drawing/2016/SVG/main" r:embed="rId8"/>
-                  </a:ext>
-                </a:extLst>
-              </a:blip>
-              <a:stretch>
-                <a:fillRect/>
-              </a:stretch>
-            </p:blipFill>
-            <p:spPr>
-              <a:xfrm>
-                <a:off x="10641965" y="2514600"/>
-                <a:ext cx="914400" cy="914400"/>
-              </a:xfrm>
-              <a:prstGeom prst="rect">
-                <a:avLst/>
-              </a:prstGeom>
-            </p:spPr>
-          </p:pic>
-          <p:cxnSp>
-            <p:nvCxnSpPr>
-              <p:cNvPr id="23" name="Connector: Elbow 22">
-                <a:extLst>
-                  <a:ext uri="{FF2B5EF4-FFF2-40B4-BE49-F238E27FC236}">
-                    <a16:creationId xmlns:a16="http://schemas.microsoft.com/office/drawing/2014/main" id="{6B8CA8DA-A575-48D8-AE97-55F82B23CEA8}"/>
-                  </a:ext>
-                </a:extLst>
-              </p:cNvPr>
-              <p:cNvCxnSpPr>
-                <a:cxnSpLocks/>
-                <a:stCxn id="17" idx="3"/>
-                <a:endCxn id="21" idx="2"/>
-              </p:cNvCxnSpPr>
-              <p:nvPr/>
-            </p:nvCxnSpPr>
-            <p:spPr>
-              <a:xfrm flipV="1">
-                <a:off x="9658349" y="3429000"/>
-                <a:ext cx="1440816" cy="1508284"/>
-              </a:xfrm>
-              <a:prstGeom prst="bentConnector2">
-                <a:avLst/>
-              </a:prstGeom>
-              <a:ln w="28575">
-                <a:tailEnd type="triangle"/>
-              </a:ln>
-            </p:spPr>
-            <p:style>
-              <a:lnRef idx="1">
-                <a:schemeClr val="accent1"/>
-              </a:lnRef>
-              <a:fillRef idx="0">
-                <a:schemeClr val="accent1"/>
-              </a:fillRef>
-              <a:effectRef idx="0">
-                <a:schemeClr val="accent1"/>
-              </a:effectRef>
-              <a:fontRef idx="minor">
-                <a:schemeClr val="tx1"/>
-              </a:fontRef>
-            </p:style>
-          </p:cxnSp>
-          <p:cxnSp>
-            <p:nvCxnSpPr>
-              <p:cNvPr id="38" name="Connector: Elbow 37">
-                <a:extLst>
-                  <a:ext uri="{FF2B5EF4-FFF2-40B4-BE49-F238E27FC236}">
-                    <a16:creationId xmlns:a16="http://schemas.microsoft.com/office/drawing/2014/main" id="{50E73AB1-6F6F-4C02-B281-53C5EC71857C}"/>
-                  </a:ext>
-                </a:extLst>
-              </p:cNvPr>
-              <p:cNvCxnSpPr>
-                <a:cxnSpLocks/>
-                <a:stCxn id="21" idx="0"/>
-                <a:endCxn id="11" idx="3"/>
-              </p:cNvCxnSpPr>
-              <p:nvPr/>
-            </p:nvCxnSpPr>
-            <p:spPr>
-              <a:xfrm rot="16200000" flipV="1">
-                <a:off x="9937513" y="1352947"/>
-                <a:ext cx="882490" cy="1440815"/>
-              </a:xfrm>
-              <a:prstGeom prst="bentConnector2">
-                <a:avLst/>
-              </a:prstGeom>
-              <a:ln w="28575">
-                <a:tailEnd type="triangle"/>
-              </a:ln>
-            </p:spPr>
-            <p:style>
-              <a:lnRef idx="1">
-                <a:schemeClr val="accent1"/>
-              </a:lnRef>
-              <a:fillRef idx="0">
-                <a:schemeClr val="accent1"/>
-              </a:fillRef>
-              <a:effectRef idx="0">
-                <a:schemeClr val="accent1"/>
-              </a:effectRef>
-              <a:fontRef idx="minor">
-                <a:schemeClr val="tx1"/>
-              </a:fontRef>
-            </p:style>
-          </p:cxnSp>
-          <p:cxnSp>
-            <p:nvCxnSpPr>
-              <p:cNvPr id="1033" name="Straight Arrow Connector 1032">
-                <a:extLst>
-                  <a:ext uri="{FF2B5EF4-FFF2-40B4-BE49-F238E27FC236}">
-                    <a16:creationId xmlns:a16="http://schemas.microsoft.com/office/drawing/2014/main" id="{7F9C91E8-C603-437B-A044-7BE950618458}"/>
-                  </a:ext>
-                </a:extLst>
-              </p:cNvPr>
-              <p:cNvCxnSpPr>
-                <a:stCxn id="11" idx="2"/>
-                <a:endCxn id="16" idx="0"/>
-              </p:cNvCxnSpPr>
-              <p:nvPr/>
-            </p:nvCxnSpPr>
-            <p:spPr>
-              <a:xfrm flipH="1">
-                <a:off x="6248399" y="1911669"/>
-                <a:ext cx="1" cy="602931"/>
-              </a:xfrm>
-              <a:prstGeom prst="straightConnector1">
-                <a:avLst/>
-              </a:prstGeom>
-              <a:ln w="28575">
-                <a:tailEnd type="triangle"/>
-              </a:ln>
-            </p:spPr>
-            <p:style>
-              <a:lnRef idx="1">
-                <a:schemeClr val="accent1"/>
-              </a:lnRef>
-              <a:fillRef idx="0">
-                <a:schemeClr val="accent1"/>
-              </a:fillRef>
-              <a:effectRef idx="0">
-                <a:schemeClr val="accent1"/>
-              </a:effectRef>
-              <a:fontRef idx="minor">
-                <a:schemeClr val="tx1"/>
-              </a:fontRef>
-            </p:style>
-          </p:cxnSp>
-          <p:sp>
-            <p:nvSpPr>
-              <p:cNvPr id="43" name="Rectangle: Rounded Corners 42">
-                <a:extLst>
-                  <a:ext uri="{FF2B5EF4-FFF2-40B4-BE49-F238E27FC236}">
-                    <a16:creationId xmlns:a16="http://schemas.microsoft.com/office/drawing/2014/main" id="{1A6CAD6F-C4B7-4D13-8E04-EA5932E46B51}"/>
-                  </a:ext>
-                </a:extLst>
-              </p:cNvPr>
-              <p:cNvSpPr/>
-              <p:nvPr/>
-            </p:nvSpPr>
-            <p:spPr>
-              <a:xfrm>
-                <a:off x="2838450" y="3586162"/>
-                <a:ext cx="2676526" cy="565467"/>
-              </a:xfrm>
-              <a:prstGeom prst="roundRect">
-                <a:avLst/>
-              </a:prstGeom>
-              <a:solidFill>
-                <a:srgbClr val="7030A0"/>
-              </a:solidFill>
-              <a:ln>
-                <a:noFill/>
-              </a:ln>
-            </p:spPr>
-            <p:style>
-              <a:lnRef idx="2">
-                <a:schemeClr val="accent1">
-                  <a:shade val="50000"/>
-                </a:schemeClr>
-              </a:lnRef>
-              <a:fillRef idx="1">
-                <a:schemeClr val="accent1"/>
-              </a:fillRef>
-              <a:effectRef idx="0">
-                <a:schemeClr val="accent1"/>
-              </a:effectRef>
-              <a:fontRef idx="minor">
-                <a:schemeClr val="lt1"/>
-              </a:fontRef>
-            </p:style>
-            <p:txBody>
-              <a:bodyPr rtlCol="0" anchor="ctr"/>
-              <a:lstStyle/>
-              <a:p>
-                <a:pPr algn="ctr"/>
-                <a:r>
-                  <a:rPr lang="en-US" dirty="0"/>
-                  <a:t>Cache</a:t>
-                </a:r>
-              </a:p>
-            </p:txBody>
-          </p:sp>
-          <p:sp>
-            <p:nvSpPr>
-              <p:cNvPr id="44" name="Rectangle: Rounded Corners 43">
-                <a:extLst>
-                  <a:ext uri="{FF2B5EF4-FFF2-40B4-BE49-F238E27FC236}">
-                    <a16:creationId xmlns:a16="http://schemas.microsoft.com/office/drawing/2014/main" id="{EBB3025D-BBE2-454D-8EE9-B380E8953599}"/>
-                  </a:ext>
-                </a:extLst>
-              </p:cNvPr>
-              <p:cNvSpPr/>
-              <p:nvPr/>
-            </p:nvSpPr>
-            <p:spPr>
-              <a:xfrm>
-                <a:off x="6981823" y="3586162"/>
-                <a:ext cx="2676526" cy="565467"/>
-              </a:xfrm>
-              <a:prstGeom prst="roundRect">
-                <a:avLst/>
-              </a:prstGeom>
-              <a:solidFill>
-                <a:schemeClr val="accent4"/>
-              </a:solidFill>
-              <a:ln>
-                <a:noFill/>
-              </a:ln>
-            </p:spPr>
-            <p:style>
-              <a:lnRef idx="2">
-                <a:schemeClr val="accent1">
-                  <a:shade val="50000"/>
-                </a:schemeClr>
-              </a:lnRef>
-              <a:fillRef idx="1">
-                <a:schemeClr val="accent1"/>
-              </a:fillRef>
-              <a:effectRef idx="0">
-                <a:schemeClr val="accent1"/>
-              </a:effectRef>
-              <a:fontRef idx="minor">
-                <a:schemeClr val="lt1"/>
-              </a:fontRef>
-            </p:style>
-            <p:txBody>
-              <a:bodyPr rtlCol="0" anchor="ctr"/>
-              <a:lstStyle/>
-              <a:p>
-                <a:pPr algn="ctr"/>
-                <a:r>
-                  <a:rPr lang="en-US" dirty="0"/>
-                  <a:t>Utils</a:t>
-                </a:r>
-              </a:p>
-            </p:txBody>
-          </p:sp>
-          <p:cxnSp>
-            <p:nvCxnSpPr>
-              <p:cNvPr id="45" name="Straight Arrow Connector 44">
-                <a:extLst>
-                  <a:ext uri="{FF2B5EF4-FFF2-40B4-BE49-F238E27FC236}">
-                    <a16:creationId xmlns:a16="http://schemas.microsoft.com/office/drawing/2014/main" id="{CBBF9E6F-8FE1-4676-B06E-FC922E4212AB}"/>
-                  </a:ext>
-                </a:extLst>
-              </p:cNvPr>
-              <p:cNvCxnSpPr>
-                <a:cxnSpLocks/>
-                <a:endCxn id="43" idx="0"/>
-              </p:cNvCxnSpPr>
-              <p:nvPr/>
-            </p:nvCxnSpPr>
-            <p:spPr>
-              <a:xfrm>
-                <a:off x="4176713" y="3040380"/>
-                <a:ext cx="0" cy="545782"/>
-              </a:xfrm>
-              <a:prstGeom prst="straightConnector1">
-                <a:avLst/>
-              </a:prstGeom>
-              <a:ln w="28575">
-                <a:tailEnd type="triangle"/>
-              </a:ln>
-            </p:spPr>
-            <p:style>
-              <a:lnRef idx="1">
-                <a:schemeClr val="accent1"/>
-              </a:lnRef>
-              <a:fillRef idx="0">
-                <a:schemeClr val="accent1"/>
-              </a:fillRef>
-              <a:effectRef idx="0">
-                <a:schemeClr val="accent1"/>
-              </a:effectRef>
-              <a:fontRef idx="minor">
-                <a:schemeClr val="tx1"/>
-              </a:fontRef>
-            </p:style>
-          </p:cxnSp>
-          <p:cxnSp>
-            <p:nvCxnSpPr>
-              <p:cNvPr id="49" name="Connector: Elbow 48">
-                <a:extLst>
-                  <a:ext uri="{FF2B5EF4-FFF2-40B4-BE49-F238E27FC236}">
-                    <a16:creationId xmlns:a16="http://schemas.microsoft.com/office/drawing/2014/main" id="{0CC2593D-D111-4B2A-9F03-9CB60347D659}"/>
-                  </a:ext>
-                </a:extLst>
-              </p:cNvPr>
-              <p:cNvCxnSpPr>
-                <a:cxnSpLocks/>
-                <a:stCxn id="43" idx="1"/>
-                <a:endCxn id="16" idx="1"/>
-              </p:cNvCxnSpPr>
-              <p:nvPr/>
-            </p:nvCxnSpPr>
-            <p:spPr>
-              <a:xfrm rot="10800000">
-                <a:off x="2838450" y="2797334"/>
-                <a:ext cx="1" cy="1071562"/>
-              </a:xfrm>
-              <a:prstGeom prst="bentConnector3">
-                <a:avLst>
-                  <a:gd name="adj1" fmla="val 22860100000"/>
-                </a:avLst>
-              </a:prstGeom>
-              <a:ln w="28575">
-                <a:tailEnd type="triangle"/>
-              </a:ln>
-            </p:spPr>
-            <p:style>
-              <a:lnRef idx="1">
-                <a:schemeClr val="accent1"/>
-              </a:lnRef>
-              <a:fillRef idx="0">
-                <a:schemeClr val="accent1"/>
-              </a:fillRef>
-              <a:effectRef idx="0">
-                <a:schemeClr val="accent1"/>
-              </a:effectRef>
-              <a:fontRef idx="minor">
-                <a:schemeClr val="tx1"/>
-              </a:fontRef>
-            </p:style>
-          </p:cxnSp>
-          <p:cxnSp>
-            <p:nvCxnSpPr>
-              <p:cNvPr id="52" name="Connector: Elbow 51">
-                <a:extLst>
-                  <a:ext uri="{FF2B5EF4-FFF2-40B4-BE49-F238E27FC236}">
-                    <a16:creationId xmlns:a16="http://schemas.microsoft.com/office/drawing/2014/main" id="{F79E9DF1-7B81-4831-AB96-D0763CA2F645}"/>
-                  </a:ext>
-                </a:extLst>
-              </p:cNvPr>
-              <p:cNvCxnSpPr>
-                <a:cxnSpLocks/>
-                <a:stCxn id="44" idx="3"/>
-                <a:endCxn id="16" idx="3"/>
-              </p:cNvCxnSpPr>
-              <p:nvPr/>
-            </p:nvCxnSpPr>
-            <p:spPr>
-              <a:xfrm flipV="1">
-                <a:off x="9658349" y="2797334"/>
-                <a:ext cx="12700" cy="1071562"/>
-              </a:xfrm>
-              <a:prstGeom prst="bentConnector3">
-                <a:avLst>
-                  <a:gd name="adj1" fmla="val 1800000"/>
-                </a:avLst>
-              </a:prstGeom>
-              <a:ln w="28575">
-                <a:tailEnd type="triangle"/>
-              </a:ln>
-            </p:spPr>
-            <p:style>
-              <a:lnRef idx="1">
-                <a:schemeClr val="accent1"/>
-              </a:lnRef>
-              <a:fillRef idx="0">
-                <a:schemeClr val="accent1"/>
-              </a:fillRef>
-              <a:effectRef idx="0">
-                <a:schemeClr val="accent1"/>
-              </a:effectRef>
-              <a:fontRef idx="minor">
-                <a:schemeClr val="tx1"/>
-              </a:fontRef>
-            </p:style>
-          </p:cxnSp>
         </p:grpSp>
-        <p:sp>
-          <p:nvSpPr>
-            <p:cNvPr id="1051" name="TextBox 1050">
+        <p:cxnSp>
+          <p:nvCxnSpPr>
+            <p:cNvPr id="27" name="Straight Arrow Connector 26">
               <a:extLst>
                 <a:ext uri="{FF2B5EF4-FFF2-40B4-BE49-F238E27FC236}">
-                  <a16:creationId xmlns:a16="http://schemas.microsoft.com/office/drawing/2014/main" id="{14B83927-4080-47D8-B257-0BEECC7DB5BC}"/>
+                  <a16:creationId xmlns:a16="http://schemas.microsoft.com/office/drawing/2014/main" id="{412C2CAD-F8E8-40BD-A569-A3E4C183DEAC}"/>
                 </a:ext>
               </a:extLst>
             </p:cNvPr>
-            <p:cNvSpPr txBox="1"/>
+            <p:cNvCxnSpPr>
+              <a:cxnSpLocks/>
+              <a:stCxn id="16" idx="2"/>
+            </p:cNvCxnSpPr>
             <p:nvPr/>
-          </p:nvSpPr>
+          </p:nvCxnSpPr>
           <p:spPr>
             <a:xfrm>
-              <a:off x="540066" y="3303320"/>
-              <a:ext cx="1162367" cy="646331"/>
+              <a:off x="6248399" y="3080067"/>
+              <a:ext cx="0" cy="1691958"/>
             </a:xfrm>
-            <a:prstGeom prst="rect">
+            <a:prstGeom prst="straightConnector1">
               <a:avLst/>
             </a:prstGeom>
-            <a:noFill/>
+            <a:ln w="28575">
+              <a:tailEnd type="triangle"/>
+            </a:ln>
           </p:spPr>
-          <p:txBody>
-            <a:bodyPr wrap="square" rtlCol="0">
-              <a:spAutoFit/>
-            </a:bodyPr>
-            <a:lstStyle/>
-            <a:p>
-              <a:pPr algn="ctr"/>
-              <a:r>
-                <a:rPr lang="en-US" b="1" dirty="0">
-                  <a:solidFill>
-                    <a:schemeClr val="accent1">
-                      <a:lumMod val="75000"/>
-                    </a:schemeClr>
-                  </a:solidFill>
-                </a:rPr>
-                <a:t>Telegram Client</a:t>
-              </a:r>
-            </a:p>
-          </p:txBody>
-        </p:sp>
-        <p:sp>
-          <p:nvSpPr>
-            <p:cNvPr id="67" name="TextBox 66">
-              <a:extLst>
-                <a:ext uri="{FF2B5EF4-FFF2-40B4-BE49-F238E27FC236}">
-                  <a16:creationId xmlns:a16="http://schemas.microsoft.com/office/drawing/2014/main" id="{50FFA7F7-6BCF-4E78-9F57-580B87D069CE}"/>
-                </a:ext>
-              </a:extLst>
-            </p:cNvPr>
-            <p:cNvSpPr txBox="1"/>
-            <p:nvPr/>
-          </p:nvSpPr>
-          <p:spPr>
-            <a:xfrm>
-              <a:off x="11029633" y="3009949"/>
-              <a:ext cx="1162367" cy="646331"/>
-            </a:xfrm>
-            <a:prstGeom prst="rect">
-              <a:avLst/>
-            </a:prstGeom>
-            <a:noFill/>
-          </p:spPr>
-          <p:txBody>
-            <a:bodyPr wrap="square" rtlCol="0">
-              <a:spAutoFit/>
-            </a:bodyPr>
-            <a:lstStyle/>
-            <a:p>
-              <a:pPr algn="ctr"/>
-              <a:r>
-                <a:rPr lang="en-US" b="1" dirty="0">
-                  <a:solidFill>
-                    <a:schemeClr val="accent1">
-                      <a:lumMod val="75000"/>
-                    </a:schemeClr>
-                  </a:solidFill>
-                </a:rPr>
-                <a:t>Bot Platform</a:t>
-              </a:r>
-            </a:p>
-          </p:txBody>
-        </p:sp>
+          <p:style>
+            <a:lnRef idx="1">
+              <a:schemeClr val="accent1"/>
+            </a:lnRef>
+            <a:fillRef idx="0">
+              <a:schemeClr val="accent1"/>
+            </a:fillRef>
+            <a:effectRef idx="0">
+              <a:schemeClr val="accent1"/>
+            </a:effectRef>
+            <a:fontRef idx="minor">
+              <a:schemeClr val="tx1"/>
+            </a:fontRef>
+          </p:style>
+        </p:cxnSp>
       </p:grpSp>
     </p:spTree>
     <p:extLst>

</xml_diff>